<commit_message>
making test easier to see in the runner
</commit_message>
<xml_diff>
--- a/Lectures/integration-testing.pptx
+++ b/Lectures/integration-testing.pptx
@@ -207,7 +207,7 @@
             <a:pPr rtl="0"/>
             <a:fld id="{D41B49EE-D55C-4AD5-AE6A-B09AB57F7266}" type="datetime1">
               <a:rPr lang="pl-PL" smtClean="0"/>
-              <a:t>15.02.2021</a:t>
+              <a:t>13.05.2021</a:t>
             </a:fld>
             <a:endParaRPr lang="en-US" dirty="0"/>
           </a:p>
@@ -377,7 +377,7 @@
             <a:pPr rtl="0"/>
             <a:fld id="{A3051B73-E311-44BF-8D6D-9137AB9F3DE8}" type="datetime1">
               <a:rPr lang="pl-PL" smtClean="0"/>
-              <a:t>15.02.2021</a:t>
+              <a:t>13.05.2021</a:t>
             </a:fld>
             <a:endParaRPr lang="en-US"/>
           </a:p>
@@ -891,7 +891,7 @@
             <a:pPr rtl="0"/>
             <a:fld id="{6A255EE4-F95C-49B3-ACD4-7CA3D00C795E}" type="datetime1">
               <a:rPr lang="pl-PL" smtClean="0"/>
-              <a:t>15.02.2021</a:t>
+              <a:t>13.05.2021</a:t>
             </a:fld>
             <a:endParaRPr lang="en-US" dirty="0"/>
           </a:p>
@@ -1098,7 +1098,7 @@
             <a:pPr rtl="0"/>
             <a:fld id="{73F1D04E-0CE8-4348-8D3C-4F97263154FA}" type="datetime1">
               <a:rPr lang="pl-PL" smtClean="0"/>
-              <a:t>15.02.2021</a:t>
+              <a:t>13.05.2021</a:t>
             </a:fld>
             <a:endParaRPr lang="en-US" dirty="0"/>
           </a:p>
@@ -1464,7 +1464,7 @@
             <a:pPr rtl="0"/>
             <a:fld id="{199848F2-EC7B-4A2E-A4EA-D56A99AC03B6}" type="datetime1">
               <a:rPr lang="pl-PL" smtClean="0"/>
-              <a:t>15.02.2021</a:t>
+              <a:t>13.05.2021</a:t>
             </a:fld>
             <a:endParaRPr lang="en-US" dirty="0"/>
           </a:p>
@@ -1666,7 +1666,7 @@
             <a:pPr rtl="0"/>
             <a:fld id="{4002B9CC-9A39-4A3E-A11C-2AA5A4A43696}" type="datetime1">
               <a:rPr lang="pl-PL" smtClean="0"/>
-              <a:t>15.02.2021</a:t>
+              <a:t>13.05.2021</a:t>
             </a:fld>
             <a:endParaRPr lang="en-US" dirty="0"/>
           </a:p>
@@ -1982,7 +1982,7 @@
             <a:pPr rtl="0"/>
             <a:fld id="{143DF7B8-0E4E-4FC5-86DA-BF07D7501F68}" type="datetime1">
               <a:rPr lang="pl-PL" smtClean="0"/>
-              <a:t>15.02.2021</a:t>
+              <a:t>13.05.2021</a:t>
             </a:fld>
             <a:endParaRPr lang="en-US" dirty="0"/>
           </a:p>
@@ -2239,7 +2239,7 @@
             <a:pPr rtl="0"/>
             <a:fld id="{20115373-D71C-43CC-A9B0-C5F5B0EAD476}" type="datetime1">
               <a:rPr lang="pl-PL" smtClean="0"/>
-              <a:t>15.02.2021</a:t>
+              <a:t>13.05.2021</a:t>
             </a:fld>
             <a:endParaRPr lang="en-US" dirty="0"/>
           </a:p>
@@ -2665,7 +2665,7 @@
             <a:pPr rtl="0"/>
             <a:fld id="{C24BF620-47B2-4AAA-B965-6575C26AEC58}" type="datetime1">
               <a:rPr lang="pl-PL" smtClean="0"/>
-              <a:t>15.02.2021</a:t>
+              <a:t>13.05.2021</a:t>
             </a:fld>
             <a:endParaRPr lang="en-US" dirty="0"/>
           </a:p>
@@ -2792,7 +2792,7 @@
             <a:pPr rtl="0"/>
             <a:fld id="{98A70DB5-3B74-47E3-90B3-6FF4DAF5961C}" type="datetime1">
               <a:rPr lang="pl-PL" smtClean="0"/>
-              <a:t>15.02.2021</a:t>
+              <a:t>13.05.2021</a:t>
             </a:fld>
             <a:endParaRPr lang="en-US" dirty="0"/>
           </a:p>
@@ -2890,7 +2890,7 @@
             <a:pPr rtl="0"/>
             <a:fld id="{5ECCD3F3-1BA2-48DE-B1B4-BBD3C3E3D436}" type="datetime1">
               <a:rPr lang="pl-PL" smtClean="0"/>
-              <a:t>15.02.2021</a:t>
+              <a:t>13.05.2021</a:t>
             </a:fld>
             <a:endParaRPr lang="en-US" dirty="0"/>
           </a:p>
@@ -3271,7 +3271,7 @@
             <a:pPr rtl="0"/>
             <a:fld id="{5D2385E3-AC97-41FD-8DF3-B71EB60EA90E}" type="datetime1">
               <a:rPr lang="pl-PL" smtClean="0"/>
-              <a:t>15.02.2021</a:t>
+              <a:t>13.05.2021</a:t>
             </a:fld>
             <a:endParaRPr lang="en-US" dirty="0"/>
           </a:p>
@@ -3569,7 +3569,7 @@
             <a:pPr rtl="0"/>
             <a:fld id="{8732DF53-D588-4215-BD5B-BCC4BBD41867}" type="datetime1">
               <a:rPr lang="pl-PL" smtClean="0"/>
-              <a:t>15.02.2021</a:t>
+              <a:t>13.05.2021</a:t>
             </a:fld>
             <a:endParaRPr lang="en-US" dirty="0"/>
           </a:p>
@@ -3787,7 +3787,7 @@
             <a:pPr rtl="0"/>
             <a:fld id="{161BBFD0-E849-4FC2-BFF9-605B90695325}" type="datetime1">
               <a:rPr lang="pl-PL" smtClean="0"/>
-              <a:t>15.02.2021</a:t>
+              <a:t>13.05.2021</a:t>
             </a:fld>
             <a:endParaRPr lang="en-US" dirty="0"/>
           </a:p>
@@ -5928,38 +5928,10 @@
       </p:grpSpPr>
       <p:sp>
         <p:nvSpPr>
-          <p:cNvPr id="2" name="Tytuł 1">
+          <p:cNvPr id="21" name="Prostokąt 20">
             <a:extLst>
               <a:ext uri="{FF2B5EF4-FFF2-40B4-BE49-F238E27FC236}">
-                <a16:creationId xmlns:a16="http://schemas.microsoft.com/office/drawing/2014/main" id="{7BC70A39-560C-4ABE-817F-ADB83AFE3534}"/>
-              </a:ext>
-            </a:extLst>
-          </p:cNvPr>
-          <p:cNvSpPr>
-            <a:spLocks noGrp="1"/>
-          </p:cNvSpPr>
-          <p:nvPr>
-            <p:ph type="title"/>
-          </p:nvPr>
-        </p:nvSpPr>
-        <p:spPr/>
-        <p:txBody>
-          <a:bodyPr/>
-          <a:lstStyle/>
-          <a:p>
-            <a:r>
-              <a:rPr lang="en-US" dirty="0"/>
-              <a:t>auditing</a:t>
-            </a:r>
-          </a:p>
-        </p:txBody>
-      </p:sp>
-      <p:sp>
-        <p:nvSpPr>
-          <p:cNvPr id="4" name="Prostokąt 3">
-            <a:extLst>
-              <a:ext uri="{FF2B5EF4-FFF2-40B4-BE49-F238E27FC236}">
-                <a16:creationId xmlns:a16="http://schemas.microsoft.com/office/drawing/2014/main" id="{468B5F8E-6C51-4ADE-B84F-7A5CAB513190}"/>
+                <a16:creationId xmlns:a16="http://schemas.microsoft.com/office/drawing/2014/main" id="{99E2DE17-DF5B-4B76-8D7F-8571BE78299B}"/>
               </a:ext>
             </a:extLst>
           </p:cNvPr>
@@ -5968,8 +5940,8 @@
         </p:nvSpPr>
         <p:spPr>
           <a:xfrm>
-            <a:off x="3727939" y="2505807"/>
-            <a:ext cx="3301512" cy="1718896"/>
+            <a:off x="4084026" y="5084151"/>
+            <a:ext cx="2567353" cy="934183"/>
           </a:xfrm>
           <a:prstGeom prst="rect">
             <a:avLst/>
@@ -6000,6 +5972,78 @@
       </p:sp>
       <p:sp>
         <p:nvSpPr>
+          <p:cNvPr id="2" name="Tytuł 1">
+            <a:extLst>
+              <a:ext uri="{FF2B5EF4-FFF2-40B4-BE49-F238E27FC236}">
+                <a16:creationId xmlns:a16="http://schemas.microsoft.com/office/drawing/2014/main" id="{7BC70A39-560C-4ABE-817F-ADB83AFE3534}"/>
+              </a:ext>
+            </a:extLst>
+          </p:cNvPr>
+          <p:cNvSpPr>
+            <a:spLocks noGrp="1"/>
+          </p:cNvSpPr>
+          <p:nvPr>
+            <p:ph type="title"/>
+          </p:nvPr>
+        </p:nvSpPr>
+        <p:spPr/>
+        <p:txBody>
+          <a:bodyPr/>
+          <a:lstStyle/>
+          <a:p>
+            <a:r>
+              <a:rPr lang="en-US" dirty="0"/>
+              <a:t>auditing</a:t>
+            </a:r>
+          </a:p>
+        </p:txBody>
+      </p:sp>
+      <p:sp>
+        <p:nvSpPr>
+          <p:cNvPr id="4" name="Prostokąt 3">
+            <a:extLst>
+              <a:ext uri="{FF2B5EF4-FFF2-40B4-BE49-F238E27FC236}">
+                <a16:creationId xmlns:a16="http://schemas.microsoft.com/office/drawing/2014/main" id="{468B5F8E-6C51-4ADE-B84F-7A5CAB513190}"/>
+              </a:ext>
+            </a:extLst>
+          </p:cNvPr>
+          <p:cNvSpPr/>
+          <p:nvPr/>
+        </p:nvSpPr>
+        <p:spPr>
+          <a:xfrm>
+            <a:off x="3727939" y="2505807"/>
+            <a:ext cx="3301512" cy="1718896"/>
+          </a:xfrm>
+          <a:prstGeom prst="rect">
+            <a:avLst/>
+          </a:prstGeom>
+        </p:spPr>
+        <p:style>
+          <a:lnRef idx="2">
+            <a:schemeClr val="accent6"/>
+          </a:lnRef>
+          <a:fillRef idx="1">
+            <a:schemeClr val="lt1"/>
+          </a:fillRef>
+          <a:effectRef idx="0">
+            <a:schemeClr val="accent6"/>
+          </a:effectRef>
+          <a:fontRef idx="minor">
+            <a:schemeClr val="dk1"/>
+          </a:fontRef>
+        </p:style>
+        <p:txBody>
+          <a:bodyPr rtlCol="0" anchor="ctr"/>
+          <a:lstStyle/>
+          <a:p>
+            <a:pPr algn="ctr"/>
+            <a:endParaRPr lang="en-US"/>
+          </a:p>
+        </p:txBody>
+      </p:sp>
+      <p:sp>
+        <p:nvSpPr>
           <p:cNvPr id="5" name="pole tekstowe 4">
             <a:extLst>
               <a:ext uri="{FF2B5EF4-FFF2-40B4-BE49-F238E27FC236}">
@@ -6058,14 +6102,14 @@
           </a:ln>
         </p:spPr>
         <p:style>
-          <a:lnRef idx="1">
-            <a:schemeClr val="accent1"/>
+          <a:lnRef idx="3">
+            <a:schemeClr val="dk1"/>
           </a:lnRef>
           <a:fillRef idx="0">
-            <a:schemeClr val="accent1"/>
+            <a:schemeClr val="dk1"/>
           </a:fillRef>
-          <a:effectRef idx="0">
-            <a:schemeClr val="accent1"/>
+          <a:effectRef idx="2">
+            <a:schemeClr val="dk1"/>
           </a:effectRef>
           <a:fontRef idx="minor">
             <a:schemeClr val="tx1"/>
@@ -6097,14 +6141,14 @@
           </a:ln>
         </p:spPr>
         <p:style>
-          <a:lnRef idx="1">
-            <a:schemeClr val="accent1"/>
+          <a:lnRef idx="3">
+            <a:schemeClr val="dk1"/>
           </a:lnRef>
           <a:fillRef idx="0">
-            <a:schemeClr val="accent1"/>
+            <a:schemeClr val="dk1"/>
           </a:fillRef>
-          <a:effectRef idx="0">
-            <a:schemeClr val="accent1"/>
+          <a:effectRef idx="2">
+            <a:schemeClr val="dk1"/>
           </a:effectRef>
           <a:fontRef idx="minor">
             <a:schemeClr val="tx1"/>
@@ -6136,14 +6180,14 @@
           </a:ln>
         </p:spPr>
         <p:style>
-          <a:lnRef idx="1">
-            <a:schemeClr val="accent1"/>
+          <a:lnRef idx="3">
+            <a:schemeClr val="dk1"/>
           </a:lnRef>
           <a:fillRef idx="0">
-            <a:schemeClr val="accent1"/>
+            <a:schemeClr val="dk1"/>
           </a:fillRef>
-          <a:effectRef idx="0">
-            <a:schemeClr val="accent1"/>
+          <a:effectRef idx="2">
+            <a:schemeClr val="dk1"/>
           </a:effectRef>
           <a:fontRef idx="minor">
             <a:schemeClr val="tx1"/>
@@ -6175,14 +6219,14 @@
           </a:ln>
         </p:spPr>
         <p:style>
-          <a:lnRef idx="1">
-            <a:schemeClr val="accent1"/>
+          <a:lnRef idx="3">
+            <a:schemeClr val="dk1"/>
           </a:lnRef>
           <a:fillRef idx="0">
-            <a:schemeClr val="accent1"/>
+            <a:schemeClr val="dk1"/>
           </a:fillRef>
-          <a:effectRef idx="0">
-            <a:schemeClr val="accent1"/>
+          <a:effectRef idx="2">
+            <a:schemeClr val="dk1"/>
           </a:effectRef>
           <a:fontRef idx="minor">
             <a:schemeClr val="tx1"/>
@@ -6203,7 +6247,7 @@
         </p:nvSpPr>
         <p:spPr>
           <a:xfrm>
-            <a:off x="1926771" y="5467739"/>
+            <a:off x="4374949" y="5274308"/>
             <a:ext cx="452535" cy="508518"/>
           </a:xfrm>
           <a:prstGeom prst="rect">
@@ -6250,7 +6294,7 @@
         </p:nvSpPr>
         <p:spPr>
           <a:xfrm>
-            <a:off x="2424404" y="5467739"/>
+            <a:off x="5907921" y="5274308"/>
             <a:ext cx="452535" cy="508518"/>
           </a:xfrm>
           <a:prstGeom prst="rect">
@@ -6297,7 +6341,7 @@
         </p:nvSpPr>
         <p:spPr>
           <a:xfrm>
-            <a:off x="2922037" y="5467739"/>
+            <a:off x="4885903" y="5274308"/>
             <a:ext cx="452535" cy="508518"/>
           </a:xfrm>
           <a:prstGeom prst="rect">
@@ -6344,7 +6388,7 @@
         </p:nvSpPr>
         <p:spPr>
           <a:xfrm>
-            <a:off x="3415004" y="5467739"/>
+            <a:off x="5405916" y="5274308"/>
             <a:ext cx="452535" cy="508518"/>
           </a:xfrm>
           <a:prstGeom prst="rect">
@@ -6379,41 +6423,6 @@
       </p:sp>
       <p:sp>
         <p:nvSpPr>
-          <p:cNvPr id="16" name="pole tekstowe 15">
-            <a:extLst>
-              <a:ext uri="{FF2B5EF4-FFF2-40B4-BE49-F238E27FC236}">
-                <a16:creationId xmlns:a16="http://schemas.microsoft.com/office/drawing/2014/main" id="{1C2B960C-61BE-433C-8440-A6A98C6FA329}"/>
-              </a:ext>
-            </a:extLst>
-          </p:cNvPr>
-          <p:cNvSpPr txBox="1"/>
-          <p:nvPr/>
-        </p:nvSpPr>
-        <p:spPr>
-          <a:xfrm>
-            <a:off x="3965510" y="5502636"/>
-            <a:ext cx="413896" cy="369332"/>
-          </a:xfrm>
-          <a:prstGeom prst="rect">
-            <a:avLst/>
-          </a:prstGeom>
-          <a:noFill/>
-        </p:spPr>
-        <p:txBody>
-          <a:bodyPr wrap="none" rtlCol="0">
-            <a:spAutoFit/>
-          </a:bodyPr>
-          <a:lstStyle/>
-          <a:p>
-            <a:r>
-              <a:rPr lang="en-US" dirty="0"/>
-              <a:t>….</a:t>
-            </a:r>
-          </a:p>
-        </p:txBody>
-      </p:sp>
-      <p:sp>
-        <p:nvSpPr>
           <p:cNvPr id="17" name="pole tekstowe 16">
             <a:extLst>
               <a:ext uri="{FF2B5EF4-FFF2-40B4-BE49-F238E27FC236}">
@@ -6552,6 +6561,205 @@
           </a:p>
         </p:txBody>
       </p:sp>
+      <p:sp>
+        <p:nvSpPr>
+          <p:cNvPr id="22" name="pole tekstowe 21">
+            <a:extLst>
+              <a:ext uri="{FF2B5EF4-FFF2-40B4-BE49-F238E27FC236}">
+                <a16:creationId xmlns:a16="http://schemas.microsoft.com/office/drawing/2014/main" id="{54CAF110-9FB8-4794-8D6A-5FD31C3869CB}"/>
+              </a:ext>
+            </a:extLst>
+          </p:cNvPr>
+          <p:cNvSpPr txBox="1"/>
+          <p:nvPr/>
+        </p:nvSpPr>
+        <p:spPr>
+          <a:xfrm>
+            <a:off x="4782175" y="6203347"/>
+            <a:ext cx="1021703" cy="368559"/>
+          </a:xfrm>
+          <a:prstGeom prst="rect">
+            <a:avLst/>
+          </a:prstGeom>
+          <a:noFill/>
+        </p:spPr>
+        <p:txBody>
+          <a:bodyPr wrap="square" rtlCol="0">
+            <a:spAutoFit/>
+          </a:bodyPr>
+          <a:lstStyle/>
+          <a:p>
+            <a:r>
+              <a:rPr lang="en-US" dirty="0"/>
+              <a:t>Audit log</a:t>
+            </a:r>
+          </a:p>
+        </p:txBody>
+      </p:sp>
+      <p:cxnSp>
+        <p:nvCxnSpPr>
+          <p:cNvPr id="6" name="Łącznik: łamany 5">
+            <a:extLst>
+              <a:ext uri="{FF2B5EF4-FFF2-40B4-BE49-F238E27FC236}">
+                <a16:creationId xmlns:a16="http://schemas.microsoft.com/office/drawing/2014/main" id="{28872676-A41A-40AA-BCAD-74BB606E171A}"/>
+              </a:ext>
+            </a:extLst>
+          </p:cNvPr>
+          <p:cNvCxnSpPr>
+            <a:endCxn id="21" idx="1"/>
+          </p:cNvCxnSpPr>
+          <p:nvPr/>
+        </p:nvCxnSpPr>
+        <p:spPr>
+          <a:xfrm rot="16200000" flipH="1">
+            <a:off x="2694292" y="4161509"/>
+            <a:ext cx="2185988" cy="593480"/>
+          </a:xfrm>
+          <a:prstGeom prst="bentConnector2">
+            <a:avLst/>
+          </a:prstGeom>
+          <a:ln>
+            <a:tailEnd type="triangle"/>
+          </a:ln>
+        </p:spPr>
+        <p:style>
+          <a:lnRef idx="1">
+            <a:schemeClr val="accent1"/>
+          </a:lnRef>
+          <a:fillRef idx="0">
+            <a:schemeClr val="accent1"/>
+          </a:fillRef>
+          <a:effectRef idx="0">
+            <a:schemeClr val="accent1"/>
+          </a:effectRef>
+          <a:fontRef idx="minor">
+            <a:schemeClr val="tx1"/>
+          </a:fontRef>
+        </p:style>
+      </p:cxnSp>
+      <p:cxnSp>
+        <p:nvCxnSpPr>
+          <p:cNvPr id="25" name="Łącznik: łamany 24">
+            <a:extLst>
+              <a:ext uri="{FF2B5EF4-FFF2-40B4-BE49-F238E27FC236}">
+                <a16:creationId xmlns:a16="http://schemas.microsoft.com/office/drawing/2014/main" id="{606E6DE1-987B-4615-9B14-6C173EE0BEF8}"/>
+              </a:ext>
+            </a:extLst>
+          </p:cNvPr>
+          <p:cNvCxnSpPr>
+            <a:endCxn id="21" idx="3"/>
+          </p:cNvCxnSpPr>
+          <p:nvPr/>
+        </p:nvCxnSpPr>
+        <p:spPr>
+          <a:xfrm rot="5400000">
+            <a:off x="6157421" y="4305541"/>
+            <a:ext cx="1739660" cy="751744"/>
+          </a:xfrm>
+          <a:prstGeom prst="bentConnector2">
+            <a:avLst/>
+          </a:prstGeom>
+          <a:ln>
+            <a:tailEnd type="triangle"/>
+          </a:ln>
+        </p:spPr>
+        <p:style>
+          <a:lnRef idx="1">
+            <a:schemeClr val="accent1"/>
+          </a:lnRef>
+          <a:fillRef idx="0">
+            <a:schemeClr val="accent1"/>
+          </a:fillRef>
+          <a:effectRef idx="0">
+            <a:schemeClr val="accent1"/>
+          </a:effectRef>
+          <a:fontRef idx="minor">
+            <a:schemeClr val="tx1"/>
+          </a:fontRef>
+        </p:style>
+      </p:cxnSp>
+      <p:cxnSp>
+        <p:nvCxnSpPr>
+          <p:cNvPr id="27" name="Łącznik: łamany 26">
+            <a:extLst>
+              <a:ext uri="{FF2B5EF4-FFF2-40B4-BE49-F238E27FC236}">
+                <a16:creationId xmlns:a16="http://schemas.microsoft.com/office/drawing/2014/main" id="{E253D42C-CB82-410C-B916-334B6B7E7312}"/>
+              </a:ext>
+            </a:extLst>
+          </p:cNvPr>
+          <p:cNvCxnSpPr>
+            <a:endCxn id="21" idx="3"/>
+          </p:cNvCxnSpPr>
+          <p:nvPr/>
+        </p:nvCxnSpPr>
+        <p:spPr>
+          <a:xfrm rot="5400000">
+            <a:off x="6275784" y="3719051"/>
+            <a:ext cx="2207788" cy="1456597"/>
+          </a:xfrm>
+          <a:prstGeom prst="bentConnector2">
+            <a:avLst/>
+          </a:prstGeom>
+          <a:ln>
+            <a:tailEnd type="triangle"/>
+          </a:ln>
+        </p:spPr>
+        <p:style>
+          <a:lnRef idx="1">
+            <a:schemeClr val="accent1"/>
+          </a:lnRef>
+          <a:fillRef idx="0">
+            <a:schemeClr val="accent1"/>
+          </a:fillRef>
+          <a:effectRef idx="0">
+            <a:schemeClr val="accent1"/>
+          </a:effectRef>
+          <a:fontRef idx="minor">
+            <a:schemeClr val="tx1"/>
+          </a:fontRef>
+        </p:style>
+      </p:cxnSp>
+      <p:cxnSp>
+        <p:nvCxnSpPr>
+          <p:cNvPr id="29" name="Łącznik: łamany 28">
+            <a:extLst>
+              <a:ext uri="{FF2B5EF4-FFF2-40B4-BE49-F238E27FC236}">
+                <a16:creationId xmlns:a16="http://schemas.microsoft.com/office/drawing/2014/main" id="{39D0A5EC-FC5E-43BB-8755-F7DC63287AD6}"/>
+              </a:ext>
+            </a:extLst>
+          </p:cNvPr>
+          <p:cNvCxnSpPr>
+            <a:endCxn id="21" idx="3"/>
+          </p:cNvCxnSpPr>
+          <p:nvPr/>
+        </p:nvCxnSpPr>
+        <p:spPr>
+          <a:xfrm rot="5400000">
+            <a:off x="6262018" y="3286517"/>
+            <a:ext cx="2654088" cy="1875365"/>
+          </a:xfrm>
+          <a:prstGeom prst="bentConnector2">
+            <a:avLst/>
+          </a:prstGeom>
+          <a:ln>
+            <a:tailEnd type="triangle"/>
+          </a:ln>
+        </p:spPr>
+        <p:style>
+          <a:lnRef idx="1">
+            <a:schemeClr val="accent1"/>
+          </a:lnRef>
+          <a:fillRef idx="0">
+            <a:schemeClr val="accent1"/>
+          </a:fillRef>
+          <a:effectRef idx="0">
+            <a:schemeClr val="accent1"/>
+          </a:effectRef>
+          <a:fontRef idx="minor">
+            <a:schemeClr val="tx1"/>
+          </a:fontRef>
+        </p:style>
+      </p:cxnSp>
     </p:spTree>
     <p:extLst>
       <p:ext uri="{BB962C8B-B14F-4D97-AF65-F5344CB8AC3E}">

</xml_diff>